<commit_message>
https://jira.hl7.org/browse/FHIR-36285 Standardized on CRD Client rather than EMR/EHR and clarified multi-part client
</commit_message>
<xml_diff>
--- a/input/images-source/Overview.pptx
+++ b/input/images-source/Overview.pptx
@@ -104,6 +104,11 @@
       </a:defRPr>
     </a:lvl9pPr>
   </p:defaultTextStyle>
+  <p:extLst>
+    <p:ext uri="{EFAFB233-063F-42B5-8137-9DF3F51BA10A}">
+      <p15:sldGuideLst xmlns:p15="http://schemas.microsoft.com/office/powerpoint/2012/main"/>
+    </p:ext>
+  </p:extLst>
 </p:presentation>
 </file>
 
@@ -238,7 +243,7 @@
           <a:p>
             <a:fld id="{5C14F7F8-4127-44F8-B9D4-35BAD9530B4E}" type="datetimeFigureOut">
               <a:rPr lang="en-CA" smtClean="0"/>
-              <a:t>2019-03-07</a:t>
+              <a:t>2022-11-16</a:t>
             </a:fld>
             <a:endParaRPr lang="en-CA"/>
           </a:p>
@@ -408,7 +413,7 @@
           <a:p>
             <a:fld id="{5C14F7F8-4127-44F8-B9D4-35BAD9530B4E}" type="datetimeFigureOut">
               <a:rPr lang="en-CA" smtClean="0"/>
-              <a:t>2019-03-07</a:t>
+              <a:t>2022-11-16</a:t>
             </a:fld>
             <a:endParaRPr lang="en-CA"/>
           </a:p>
@@ -588,7 +593,7 @@
           <a:p>
             <a:fld id="{5C14F7F8-4127-44F8-B9D4-35BAD9530B4E}" type="datetimeFigureOut">
               <a:rPr lang="en-CA" smtClean="0"/>
-              <a:t>2019-03-07</a:t>
+              <a:t>2022-11-16</a:t>
             </a:fld>
             <a:endParaRPr lang="en-CA"/>
           </a:p>
@@ -758,7 +763,7 @@
           <a:p>
             <a:fld id="{5C14F7F8-4127-44F8-B9D4-35BAD9530B4E}" type="datetimeFigureOut">
               <a:rPr lang="en-CA" smtClean="0"/>
-              <a:t>2019-03-07</a:t>
+              <a:t>2022-11-16</a:t>
             </a:fld>
             <a:endParaRPr lang="en-CA"/>
           </a:p>
@@ -1004,7 +1009,7 @@
           <a:p>
             <a:fld id="{5C14F7F8-4127-44F8-B9D4-35BAD9530B4E}" type="datetimeFigureOut">
               <a:rPr lang="en-CA" smtClean="0"/>
-              <a:t>2019-03-07</a:t>
+              <a:t>2022-11-16</a:t>
             </a:fld>
             <a:endParaRPr lang="en-CA"/>
           </a:p>
@@ -1236,7 +1241,7 @@
           <a:p>
             <a:fld id="{5C14F7F8-4127-44F8-B9D4-35BAD9530B4E}" type="datetimeFigureOut">
               <a:rPr lang="en-CA" smtClean="0"/>
-              <a:t>2019-03-07</a:t>
+              <a:t>2022-11-16</a:t>
             </a:fld>
             <a:endParaRPr lang="en-CA"/>
           </a:p>
@@ -1603,7 +1608,7 @@
           <a:p>
             <a:fld id="{5C14F7F8-4127-44F8-B9D4-35BAD9530B4E}" type="datetimeFigureOut">
               <a:rPr lang="en-CA" smtClean="0"/>
-              <a:t>2019-03-07</a:t>
+              <a:t>2022-11-16</a:t>
             </a:fld>
             <a:endParaRPr lang="en-CA"/>
           </a:p>
@@ -1721,7 +1726,7 @@
           <a:p>
             <a:fld id="{5C14F7F8-4127-44F8-B9D4-35BAD9530B4E}" type="datetimeFigureOut">
               <a:rPr lang="en-CA" smtClean="0"/>
-              <a:t>2019-03-07</a:t>
+              <a:t>2022-11-16</a:t>
             </a:fld>
             <a:endParaRPr lang="en-CA"/>
           </a:p>
@@ -1816,7 +1821,7 @@
           <a:p>
             <a:fld id="{5C14F7F8-4127-44F8-B9D4-35BAD9530B4E}" type="datetimeFigureOut">
               <a:rPr lang="en-CA" smtClean="0"/>
-              <a:t>2019-03-07</a:t>
+              <a:t>2022-11-16</a:t>
             </a:fld>
             <a:endParaRPr lang="en-CA"/>
           </a:p>
@@ -2093,7 +2098,7 @@
           <a:p>
             <a:fld id="{5C14F7F8-4127-44F8-B9D4-35BAD9530B4E}" type="datetimeFigureOut">
               <a:rPr lang="en-CA" smtClean="0"/>
-              <a:t>2019-03-07</a:t>
+              <a:t>2022-11-16</a:t>
             </a:fld>
             <a:endParaRPr lang="en-CA"/>
           </a:p>
@@ -2350,7 +2355,7 @@
           <a:p>
             <a:fld id="{5C14F7F8-4127-44F8-B9D4-35BAD9530B4E}" type="datetimeFigureOut">
               <a:rPr lang="en-CA" smtClean="0"/>
-              <a:t>2019-03-07</a:t>
+              <a:t>2022-11-16</a:t>
             </a:fld>
             <a:endParaRPr lang="en-CA"/>
           </a:p>
@@ -2563,7 +2568,7 @@
           <a:p>
             <a:fld id="{5C14F7F8-4127-44F8-B9D4-35BAD9530B4E}" type="datetimeFigureOut">
               <a:rPr lang="en-CA" smtClean="0"/>
-              <a:t>2019-03-07</a:t>
+              <a:t>2022-11-16</a:t>
             </a:fld>
             <a:endParaRPr lang="en-CA"/>
           </a:p>
@@ -3764,7 +3769,7 @@
           <a:p>
             <a:r>
               <a:rPr lang="en-US" sz="886" dirty="0"/>
-              <a:t>2a. Provider performs EMR action</a:t>
+              <a:t>2a. Provider performs system action</a:t>
             </a:r>
           </a:p>
         </p:txBody>

</xml_diff>